<commit_message>
Update All Lab and Lecture slides
</commit_message>
<xml_diff>
--- a/Lecture/Lecture07.pptx
+++ b/Lecture/Lecture07.pptx
@@ -214,7 +214,7 @@
           <a:p>
             <a:fld id="{634F3F22-B4BB-3F48-9180-464A9F2D66D1}" type="datetimeFigureOut">
               <a:rPr kumimoji="1" lang="zh-CN" altLang="en-US" smtClean="0"/>
-              <a:t>2021/10/24</a:t>
+              <a:t>2021/10/26</a:t>
             </a:fld>
             <a:endParaRPr kumimoji="1" lang="zh-CN" altLang="en-US"/>
           </a:p>
@@ -694,7 +694,7 @@
           <a:p>
             <a:fld id="{FC19A4FA-3D9A-4114-B0D5-759CBD56F1AB}" type="datetimeFigureOut">
               <a:rPr lang="zh-CN" altLang="en-US" smtClean="0"/>
-              <a:t>2021/10/24</a:t>
+              <a:t>2021/10/26</a:t>
             </a:fld>
             <a:endParaRPr lang="zh-CN" altLang="en-US"/>
           </a:p>
@@ -897,7 +897,7 @@
           <a:p>
             <a:fld id="{FC19A4FA-3D9A-4114-B0D5-759CBD56F1AB}" type="datetimeFigureOut">
               <a:rPr lang="zh-CN" altLang="en-US" smtClean="0"/>
-              <a:t>2021/10/24</a:t>
+              <a:t>2021/10/26</a:t>
             </a:fld>
             <a:endParaRPr lang="zh-CN" altLang="en-US"/>
           </a:p>
@@ -1075,7 +1075,7 @@
           <a:p>
             <a:fld id="{FC19A4FA-3D9A-4114-B0D5-759CBD56F1AB}" type="datetimeFigureOut">
               <a:rPr lang="zh-CN" altLang="en-US" smtClean="0"/>
-              <a:t>2021/10/24</a:t>
+              <a:t>2021/10/26</a:t>
             </a:fld>
             <a:endParaRPr lang="zh-CN" altLang="en-US"/>
           </a:p>
@@ -1299,7 +1299,7 @@
           <a:p>
             <a:fld id="{FC19A4FA-3D9A-4114-B0D5-759CBD56F1AB}" type="datetimeFigureOut">
               <a:rPr lang="zh-CN" altLang="en-US" smtClean="0"/>
-              <a:t>2021/10/24</a:t>
+              <a:t>2021/10/26</a:t>
             </a:fld>
             <a:endParaRPr lang="zh-CN" altLang="en-US"/>
           </a:p>
@@ -1533,7 +1533,7 @@
           <a:p>
             <a:fld id="{FC19A4FA-3D9A-4114-B0D5-759CBD56F1AB}" type="datetimeFigureOut">
               <a:rPr lang="zh-CN" altLang="en-US" smtClean="0"/>
-              <a:t>2021/10/24</a:t>
+              <a:t>2021/10/26</a:t>
             </a:fld>
             <a:endParaRPr lang="zh-CN" altLang="en-US"/>
           </a:p>
@@ -1932,7 +1932,7 @@
           <a:p>
             <a:fld id="{FC19A4FA-3D9A-4114-B0D5-759CBD56F1AB}" type="datetimeFigureOut">
               <a:rPr lang="zh-CN" altLang="en-US" smtClean="0"/>
-              <a:t>2021/10/24</a:t>
+              <a:t>2021/10/26</a:t>
             </a:fld>
             <a:endParaRPr lang="zh-CN" altLang="en-US"/>
           </a:p>
@@ -2212,7 +2212,7 @@
           <a:p>
             <a:fld id="{FC19A4FA-3D9A-4114-B0D5-759CBD56F1AB}" type="datetimeFigureOut">
               <a:rPr lang="zh-CN" altLang="en-US" smtClean="0"/>
-              <a:t>2021/10/24</a:t>
+              <a:t>2021/10/26</a:t>
             </a:fld>
             <a:endParaRPr lang="zh-CN" altLang="en-US"/>
           </a:p>
@@ -2364,7 +2364,7 @@
           <a:p>
             <a:fld id="{FC19A4FA-3D9A-4114-B0D5-759CBD56F1AB}" type="datetimeFigureOut">
               <a:rPr lang="zh-CN" altLang="en-US" smtClean="0"/>
-              <a:t>2021/10/24</a:t>
+              <a:t>2021/10/26</a:t>
             </a:fld>
             <a:endParaRPr lang="zh-CN" altLang="en-US"/>
           </a:p>
@@ -2494,7 +2494,7 @@
           <a:p>
             <a:fld id="{FC19A4FA-3D9A-4114-B0D5-759CBD56F1AB}" type="datetimeFigureOut">
               <a:rPr lang="zh-CN" altLang="en-US" smtClean="0"/>
-              <a:t>2021/10/24</a:t>
+              <a:t>2021/10/26</a:t>
             </a:fld>
             <a:endParaRPr lang="zh-CN" altLang="en-US"/>
           </a:p>
@@ -2804,7 +2804,7 @@
           <a:p>
             <a:fld id="{FC19A4FA-3D9A-4114-B0D5-759CBD56F1AB}" type="datetimeFigureOut">
               <a:rPr lang="zh-CN" altLang="en-US" smtClean="0"/>
-              <a:t>2021/10/24</a:t>
+              <a:t>2021/10/26</a:t>
             </a:fld>
             <a:endParaRPr lang="zh-CN" altLang="en-US"/>
           </a:p>
@@ -3091,7 +3091,7 @@
           <a:p>
             <a:fld id="{FC19A4FA-3D9A-4114-B0D5-759CBD56F1AB}" type="datetimeFigureOut">
               <a:rPr lang="zh-CN" altLang="en-US" smtClean="0"/>
-              <a:t>2021/10/24</a:t>
+              <a:t>2021/10/26</a:t>
             </a:fld>
             <a:endParaRPr lang="zh-CN" altLang="en-US"/>
           </a:p>
@@ -3384,7 +3384,7 @@
           <a:p>
             <a:fld id="{FC19A4FA-3D9A-4114-B0D5-759CBD56F1AB}" type="datetimeFigureOut">
               <a:rPr lang="zh-CN" altLang="en-US" smtClean="0"/>
-              <a:t>2021/10/24</a:t>
+              <a:t>2021/10/26</a:t>
             </a:fld>
             <a:endParaRPr lang="zh-CN" altLang="en-US"/>
           </a:p>
@@ -4907,7 +4907,7 @@
         <p:spPr>
           <a:xfrm>
             <a:off x="1471845" y="6393724"/>
-            <a:ext cx="3416320" cy="400110"/>
+            <a:ext cx="2185214" cy="400110"/>
           </a:xfrm>
           <a:prstGeom prst="rect">
             <a:avLst/>
@@ -4932,7 +4932,7 @@
                 </a:highlight>
                 <a:latin typeface="Menlo" panose="020B0609030804020204" pitchFamily="49" charset="0"/>
               </a:rPr>
-              <a:t>function-template</a:t>
+              <a:t>template2</a:t>
             </a:r>
             <a:r>
               <a:rPr lang="en" altLang="zh-CN" sz="2000" dirty="0">
@@ -5945,7 +5945,7 @@
                 </a:solidFill>
                 <a:latin typeface="Menlo" panose="020B0609030804020204" pitchFamily="49" charset="0"/>
               </a:rPr>
-              <a:t> = &amp;</a:t>
+              <a:t> = </a:t>
             </a:r>
             <a:r>
               <a:rPr lang="en" altLang="zh-CN" dirty="0">
@@ -6812,6 +6812,166 @@
                                         </p:cTn>
                                         <p:tgtEl>
                                           <p:spTgt spid="7"/>
+                                        </p:tgtEl>
+                                        <p:attrNameLst>
+                                          <p:attrName>style.visibility</p:attrName>
+                                        </p:attrNameLst>
+                                      </p:cBhvr>
+                                      <p:to>
+                                        <p:strVal val="visible"/>
+                                      </p:to>
+                                    </p:set>
+                                  </p:childTnLst>
+                                </p:cTn>
+                              </p:par>
+                            </p:childTnLst>
+                          </p:cTn>
+                        </p:par>
+                      </p:childTnLst>
+                    </p:cTn>
+                  </p:par>
+                  <p:par>
+                    <p:cTn id="7" fill="hold">
+                      <p:stCondLst>
+                        <p:cond delay="indefinite"/>
+                      </p:stCondLst>
+                      <p:childTnLst>
+                        <p:par>
+                          <p:cTn id="8" fill="hold">
+                            <p:stCondLst>
+                              <p:cond delay="0"/>
+                            </p:stCondLst>
+                            <p:childTnLst>
+                              <p:par>
+                                <p:cTn id="9" presetID="1" presetClass="entr" presetSubtype="0" fill="hold" nodeType="clickEffect">
+                                  <p:stCondLst>
+                                    <p:cond delay="0"/>
+                                  </p:stCondLst>
+                                  <p:childTnLst>
+                                    <p:set>
+                                      <p:cBhvr>
+                                        <p:cTn id="10" dur="1" fill="hold">
+                                          <p:stCondLst>
+                                            <p:cond delay="0"/>
+                                          </p:stCondLst>
+                                        </p:cTn>
+                                        <p:tgtEl>
+                                          <p:spTgt spid="4">
+                                            <p:txEl>
+                                              <p:pRg st="1" end="1"/>
+                                            </p:txEl>
+                                          </p:spTgt>
+                                        </p:tgtEl>
+                                        <p:attrNameLst>
+                                          <p:attrName>style.visibility</p:attrName>
+                                        </p:attrNameLst>
+                                      </p:cBhvr>
+                                      <p:to>
+                                        <p:strVal val="visible"/>
+                                      </p:to>
+                                    </p:set>
+                                  </p:childTnLst>
+                                </p:cTn>
+                              </p:par>
+                              <p:par>
+                                <p:cTn id="11" presetID="1" presetClass="entr" presetSubtype="0" fill="hold" nodeType="withEffect">
+                                  <p:stCondLst>
+                                    <p:cond delay="0"/>
+                                  </p:stCondLst>
+                                  <p:childTnLst>
+                                    <p:set>
+                                      <p:cBhvr>
+                                        <p:cTn id="12" dur="1" fill="hold">
+                                          <p:stCondLst>
+                                            <p:cond delay="0"/>
+                                          </p:stCondLst>
+                                        </p:cTn>
+                                        <p:tgtEl>
+                                          <p:spTgt spid="4">
+                                            <p:txEl>
+                                              <p:pRg st="3" end="3"/>
+                                            </p:txEl>
+                                          </p:spTgt>
+                                        </p:tgtEl>
+                                        <p:attrNameLst>
+                                          <p:attrName>style.visibility</p:attrName>
+                                        </p:attrNameLst>
+                                      </p:cBhvr>
+                                      <p:to>
+                                        <p:strVal val="visible"/>
+                                      </p:to>
+                                    </p:set>
+                                  </p:childTnLst>
+                                </p:cTn>
+                              </p:par>
+                            </p:childTnLst>
+                          </p:cTn>
+                        </p:par>
+                      </p:childTnLst>
+                    </p:cTn>
+                  </p:par>
+                  <p:par>
+                    <p:cTn id="13" fill="hold">
+                      <p:stCondLst>
+                        <p:cond delay="indefinite"/>
+                      </p:stCondLst>
+                      <p:childTnLst>
+                        <p:par>
+                          <p:cTn id="14" fill="hold">
+                            <p:stCondLst>
+                              <p:cond delay="0"/>
+                            </p:stCondLst>
+                            <p:childTnLst>
+                              <p:par>
+                                <p:cTn id="15" presetID="1" presetClass="entr" presetSubtype="0" fill="hold" nodeType="clickEffect">
+                                  <p:stCondLst>
+                                    <p:cond delay="0"/>
+                                  </p:stCondLst>
+                                  <p:childTnLst>
+                                    <p:set>
+                                      <p:cBhvr>
+                                        <p:cTn id="16" dur="1" fill="hold">
+                                          <p:stCondLst>
+                                            <p:cond delay="0"/>
+                                          </p:stCondLst>
+                                        </p:cTn>
+                                        <p:tgtEl>
+                                          <p:spTgt spid="4">
+                                            <p:txEl>
+                                              <p:pRg st="5" end="5"/>
+                                            </p:txEl>
+                                          </p:spTgt>
+                                        </p:tgtEl>
+                                        <p:attrNameLst>
+                                          <p:attrName>style.visibility</p:attrName>
+                                        </p:attrNameLst>
+                                      </p:cBhvr>
+                                      <p:to>
+                                        <p:strVal val="visible"/>
+                                      </p:to>
+                                    </p:set>
+                                  </p:childTnLst>
+                                </p:cTn>
+                              </p:par>
+                              <p:par>
+                                <p:cTn id="17" presetID="1" presetClass="entr" presetSubtype="0" fill="hold" nodeType="withEffect">
+                                  <p:stCondLst>
+                                    <p:cond delay="0"/>
+                                  </p:stCondLst>
+                                  <p:childTnLst>
+                                    <p:set>
+                                      <p:cBhvr>
+                                        <p:cTn id="18" dur="1" fill="hold">
+                                          <p:stCondLst>
+                                            <p:cond delay="0"/>
+                                          </p:stCondLst>
+                                        </p:cTn>
+                                        <p:tgtEl>
+                                          <p:spTgt spid="4">
+                                            <p:txEl>
+                                              <p:pRg st="7" end="7"/>
+                                            </p:txEl>
+                                          </p:spTgt>
                                         </p:tgtEl>
                                         <p:attrNameLst>
                                           <p:attrName>style.visibility</p:attrName>
@@ -8857,7 +9017,7 @@
                 </a:solidFill>
                 <a:latin typeface="Menlo" panose="020B0609030804020204" pitchFamily="49" charset="0"/>
               </a:rPr>
-              <a:t>0.1</a:t>
+              <a:t>1.0</a:t>
             </a:r>
             <a:r>
               <a:rPr lang="en" altLang="zh-CN" dirty="0">
@@ -11242,7 +11402,7 @@
                             </p:stCondLst>
                             <p:childTnLst>
                               <p:par>
-                                <p:cTn id="5" presetID="1" presetClass="entr" presetSubtype="0" fill="hold" grpId="0" nodeType="clickEffect">
+                                <p:cTn id="5" presetID="1" presetClass="entr" presetSubtype="0" fill="hold" nodeType="clickEffect">
                                   <p:stCondLst>
                                     <p:cond delay="0"/>
                                   </p:stCondLst>
@@ -11250,6 +11410,365 @@
                                     <p:set>
                                       <p:cBhvr>
                                         <p:cTn id="6" dur="1" fill="hold">
+                                          <p:stCondLst>
+                                            <p:cond delay="0"/>
+                                          </p:stCondLst>
+                                        </p:cTn>
+                                        <p:tgtEl>
+                                          <p:spTgt spid="4">
+                                            <p:txEl>
+                                              <p:pRg st="3" end="3"/>
+                                            </p:txEl>
+                                          </p:spTgt>
+                                        </p:tgtEl>
+                                        <p:attrNameLst>
+                                          <p:attrName>style.visibility</p:attrName>
+                                        </p:attrNameLst>
+                                      </p:cBhvr>
+                                      <p:to>
+                                        <p:strVal val="visible"/>
+                                      </p:to>
+                                    </p:set>
+                                  </p:childTnLst>
+                                </p:cTn>
+                              </p:par>
+                              <p:par>
+                                <p:cTn id="7" presetID="1" presetClass="entr" presetSubtype="0" fill="hold" nodeType="withEffect">
+                                  <p:stCondLst>
+                                    <p:cond delay="0"/>
+                                  </p:stCondLst>
+                                  <p:childTnLst>
+                                    <p:set>
+                                      <p:cBhvr>
+                                        <p:cTn id="8" dur="1" fill="hold">
+                                          <p:stCondLst>
+                                            <p:cond delay="0"/>
+                                          </p:stCondLst>
+                                        </p:cTn>
+                                        <p:tgtEl>
+                                          <p:spTgt spid="4">
+                                            <p:txEl>
+                                              <p:pRg st="4" end="4"/>
+                                            </p:txEl>
+                                          </p:spTgt>
+                                        </p:tgtEl>
+                                        <p:attrNameLst>
+                                          <p:attrName>style.visibility</p:attrName>
+                                        </p:attrNameLst>
+                                      </p:cBhvr>
+                                      <p:to>
+                                        <p:strVal val="visible"/>
+                                      </p:to>
+                                    </p:set>
+                                  </p:childTnLst>
+                                </p:cTn>
+                              </p:par>
+                              <p:par>
+                                <p:cTn id="9" presetID="1" presetClass="entr" presetSubtype="0" fill="hold" nodeType="withEffect">
+                                  <p:stCondLst>
+                                    <p:cond delay="0"/>
+                                  </p:stCondLst>
+                                  <p:childTnLst>
+                                    <p:set>
+                                      <p:cBhvr>
+                                        <p:cTn id="10" dur="1" fill="hold">
+                                          <p:stCondLst>
+                                            <p:cond delay="0"/>
+                                          </p:stCondLst>
+                                        </p:cTn>
+                                        <p:tgtEl>
+                                          <p:spTgt spid="4">
+                                            <p:txEl>
+                                              <p:pRg st="5" end="5"/>
+                                            </p:txEl>
+                                          </p:spTgt>
+                                        </p:tgtEl>
+                                        <p:attrNameLst>
+                                          <p:attrName>style.visibility</p:attrName>
+                                        </p:attrNameLst>
+                                      </p:cBhvr>
+                                      <p:to>
+                                        <p:strVal val="visible"/>
+                                      </p:to>
+                                    </p:set>
+                                  </p:childTnLst>
+                                </p:cTn>
+                              </p:par>
+                              <p:par>
+                                <p:cTn id="11" presetID="1" presetClass="entr" presetSubtype="0" fill="hold" nodeType="withEffect">
+                                  <p:stCondLst>
+                                    <p:cond delay="0"/>
+                                  </p:stCondLst>
+                                  <p:childTnLst>
+                                    <p:set>
+                                      <p:cBhvr>
+                                        <p:cTn id="12" dur="1" fill="hold">
+                                          <p:stCondLst>
+                                            <p:cond delay="0"/>
+                                          </p:stCondLst>
+                                        </p:cTn>
+                                        <p:tgtEl>
+                                          <p:spTgt spid="4">
+                                            <p:txEl>
+                                              <p:pRg st="6" end="6"/>
+                                            </p:txEl>
+                                          </p:spTgt>
+                                        </p:tgtEl>
+                                        <p:attrNameLst>
+                                          <p:attrName>style.visibility</p:attrName>
+                                        </p:attrNameLst>
+                                      </p:cBhvr>
+                                      <p:to>
+                                        <p:strVal val="visible"/>
+                                      </p:to>
+                                    </p:set>
+                                  </p:childTnLst>
+                                </p:cTn>
+                              </p:par>
+                              <p:par>
+                                <p:cTn id="13" presetID="1" presetClass="entr" presetSubtype="0" fill="hold" nodeType="withEffect">
+                                  <p:stCondLst>
+                                    <p:cond delay="0"/>
+                                  </p:stCondLst>
+                                  <p:childTnLst>
+                                    <p:set>
+                                      <p:cBhvr>
+                                        <p:cTn id="14" dur="1" fill="hold">
+                                          <p:stCondLst>
+                                            <p:cond delay="0"/>
+                                          </p:stCondLst>
+                                        </p:cTn>
+                                        <p:tgtEl>
+                                          <p:spTgt spid="4">
+                                            <p:txEl>
+                                              <p:pRg st="7" end="7"/>
+                                            </p:txEl>
+                                          </p:spTgt>
+                                        </p:tgtEl>
+                                        <p:attrNameLst>
+                                          <p:attrName>style.visibility</p:attrName>
+                                        </p:attrNameLst>
+                                      </p:cBhvr>
+                                      <p:to>
+                                        <p:strVal val="visible"/>
+                                      </p:to>
+                                    </p:set>
+                                  </p:childTnLst>
+                                </p:cTn>
+                              </p:par>
+                              <p:par>
+                                <p:cTn id="15" presetID="1" presetClass="entr" presetSubtype="0" fill="hold" nodeType="withEffect">
+                                  <p:stCondLst>
+                                    <p:cond delay="0"/>
+                                  </p:stCondLst>
+                                  <p:childTnLst>
+                                    <p:set>
+                                      <p:cBhvr>
+                                        <p:cTn id="16" dur="1" fill="hold">
+                                          <p:stCondLst>
+                                            <p:cond delay="0"/>
+                                          </p:stCondLst>
+                                        </p:cTn>
+                                        <p:tgtEl>
+                                          <p:spTgt spid="4">
+                                            <p:txEl>
+                                              <p:pRg st="8" end="8"/>
+                                            </p:txEl>
+                                          </p:spTgt>
+                                        </p:tgtEl>
+                                        <p:attrNameLst>
+                                          <p:attrName>style.visibility</p:attrName>
+                                        </p:attrNameLst>
+                                      </p:cBhvr>
+                                      <p:to>
+                                        <p:strVal val="visible"/>
+                                      </p:to>
+                                    </p:set>
+                                  </p:childTnLst>
+                                </p:cTn>
+                              </p:par>
+                              <p:par>
+                                <p:cTn id="17" presetID="1" presetClass="entr" presetSubtype="0" fill="hold" nodeType="withEffect">
+                                  <p:stCondLst>
+                                    <p:cond delay="0"/>
+                                  </p:stCondLst>
+                                  <p:childTnLst>
+                                    <p:set>
+                                      <p:cBhvr>
+                                        <p:cTn id="18" dur="1" fill="hold">
+                                          <p:stCondLst>
+                                            <p:cond delay="0"/>
+                                          </p:stCondLst>
+                                        </p:cTn>
+                                        <p:tgtEl>
+                                          <p:spTgt spid="4">
+                                            <p:txEl>
+                                              <p:pRg st="9" end="9"/>
+                                            </p:txEl>
+                                          </p:spTgt>
+                                        </p:tgtEl>
+                                        <p:attrNameLst>
+                                          <p:attrName>style.visibility</p:attrName>
+                                        </p:attrNameLst>
+                                      </p:cBhvr>
+                                      <p:to>
+                                        <p:strVal val="visible"/>
+                                      </p:to>
+                                    </p:set>
+                                  </p:childTnLst>
+                                </p:cTn>
+                              </p:par>
+                              <p:par>
+                                <p:cTn id="19" presetID="1" presetClass="entr" presetSubtype="0" fill="hold" nodeType="withEffect">
+                                  <p:stCondLst>
+                                    <p:cond delay="0"/>
+                                  </p:stCondLst>
+                                  <p:childTnLst>
+                                    <p:set>
+                                      <p:cBhvr>
+                                        <p:cTn id="20" dur="1" fill="hold">
+                                          <p:stCondLst>
+                                            <p:cond delay="0"/>
+                                          </p:stCondLst>
+                                        </p:cTn>
+                                        <p:tgtEl>
+                                          <p:spTgt spid="4">
+                                            <p:txEl>
+                                              <p:pRg st="10" end="10"/>
+                                            </p:txEl>
+                                          </p:spTgt>
+                                        </p:tgtEl>
+                                        <p:attrNameLst>
+                                          <p:attrName>style.visibility</p:attrName>
+                                        </p:attrNameLst>
+                                      </p:cBhvr>
+                                      <p:to>
+                                        <p:strVal val="visible"/>
+                                      </p:to>
+                                    </p:set>
+                                  </p:childTnLst>
+                                </p:cTn>
+                              </p:par>
+                              <p:par>
+                                <p:cTn id="21" presetID="1" presetClass="entr" presetSubtype="0" fill="hold" nodeType="withEffect">
+                                  <p:stCondLst>
+                                    <p:cond delay="0"/>
+                                  </p:stCondLst>
+                                  <p:childTnLst>
+                                    <p:set>
+                                      <p:cBhvr>
+                                        <p:cTn id="22" dur="1" fill="hold">
+                                          <p:stCondLst>
+                                            <p:cond delay="0"/>
+                                          </p:stCondLst>
+                                        </p:cTn>
+                                        <p:tgtEl>
+                                          <p:spTgt spid="4">
+                                            <p:txEl>
+                                              <p:pRg st="11" end="11"/>
+                                            </p:txEl>
+                                          </p:spTgt>
+                                        </p:tgtEl>
+                                        <p:attrNameLst>
+                                          <p:attrName>style.visibility</p:attrName>
+                                        </p:attrNameLst>
+                                      </p:cBhvr>
+                                      <p:to>
+                                        <p:strVal val="visible"/>
+                                      </p:to>
+                                    </p:set>
+                                  </p:childTnLst>
+                                </p:cTn>
+                              </p:par>
+                              <p:par>
+                                <p:cTn id="23" presetID="1" presetClass="entr" presetSubtype="0" fill="hold" nodeType="withEffect">
+                                  <p:stCondLst>
+                                    <p:cond delay="0"/>
+                                  </p:stCondLst>
+                                  <p:childTnLst>
+                                    <p:set>
+                                      <p:cBhvr>
+                                        <p:cTn id="24" dur="1" fill="hold">
+                                          <p:stCondLst>
+                                            <p:cond delay="0"/>
+                                          </p:stCondLst>
+                                        </p:cTn>
+                                        <p:tgtEl>
+                                          <p:spTgt spid="4">
+                                            <p:txEl>
+                                              <p:pRg st="12" end="12"/>
+                                            </p:txEl>
+                                          </p:spTgt>
+                                        </p:tgtEl>
+                                        <p:attrNameLst>
+                                          <p:attrName>style.visibility</p:attrName>
+                                        </p:attrNameLst>
+                                      </p:cBhvr>
+                                      <p:to>
+                                        <p:strVal val="visible"/>
+                                      </p:to>
+                                    </p:set>
+                                  </p:childTnLst>
+                                </p:cTn>
+                              </p:par>
+                              <p:par>
+                                <p:cTn id="25" presetID="1" presetClass="entr" presetSubtype="0" fill="hold" nodeType="withEffect">
+                                  <p:stCondLst>
+                                    <p:cond delay="0"/>
+                                  </p:stCondLst>
+                                  <p:childTnLst>
+                                    <p:set>
+                                      <p:cBhvr>
+                                        <p:cTn id="26" dur="1" fill="hold">
+                                          <p:stCondLst>
+                                            <p:cond delay="0"/>
+                                          </p:stCondLst>
+                                        </p:cTn>
+                                        <p:tgtEl>
+                                          <p:spTgt spid="4">
+                                            <p:txEl>
+                                              <p:pRg st="13" end="13"/>
+                                            </p:txEl>
+                                          </p:spTgt>
+                                        </p:tgtEl>
+                                        <p:attrNameLst>
+                                          <p:attrName>style.visibility</p:attrName>
+                                        </p:attrNameLst>
+                                      </p:cBhvr>
+                                      <p:to>
+                                        <p:strVal val="visible"/>
+                                      </p:to>
+                                    </p:set>
+                                  </p:childTnLst>
+                                </p:cTn>
+                              </p:par>
+                            </p:childTnLst>
+                          </p:cTn>
+                        </p:par>
+                      </p:childTnLst>
+                    </p:cTn>
+                  </p:par>
+                  <p:par>
+                    <p:cTn id="27" fill="hold">
+                      <p:stCondLst>
+                        <p:cond delay="indefinite"/>
+                      </p:stCondLst>
+                      <p:childTnLst>
+                        <p:par>
+                          <p:cTn id="28" fill="hold">
+                            <p:stCondLst>
+                              <p:cond delay="0"/>
+                            </p:stCondLst>
+                            <p:childTnLst>
+                              <p:par>
+                                <p:cTn id="29" presetID="1" presetClass="entr" presetSubtype="0" fill="hold" grpId="0" nodeType="clickEffect">
+                                  <p:stCondLst>
+                                    <p:cond delay="0"/>
+                                  </p:stCondLst>
+                                  <p:childTnLst>
+                                    <p:set>
+                                      <p:cBhvr>
+                                        <p:cTn id="30" dur="1" fill="hold">
                                           <p:stCondLst>
                                             <p:cond delay="0"/>
                                           </p:stCondLst>
@@ -12545,6 +13064,140 @@
   <p:clrMapOvr>
     <a:masterClrMapping/>
   </p:clrMapOvr>
+  <p:timing>
+    <p:tnLst>
+      <p:par>
+        <p:cTn id="1" dur="indefinite" restart="never" nodeType="tmRoot">
+          <p:childTnLst>
+            <p:seq concurrent="1" nextAc="seek">
+              <p:cTn id="2" dur="indefinite" nodeType="mainSeq">
+                <p:childTnLst>
+                  <p:par>
+                    <p:cTn id="3" fill="hold">
+                      <p:stCondLst>
+                        <p:cond delay="indefinite"/>
+                      </p:stCondLst>
+                      <p:childTnLst>
+                        <p:par>
+                          <p:cTn id="4" fill="hold">
+                            <p:stCondLst>
+                              <p:cond delay="0"/>
+                            </p:stCondLst>
+                            <p:childTnLst>
+                              <p:par>
+                                <p:cTn id="5" presetID="1" presetClass="entr" presetSubtype="0" fill="hold" grpId="0" nodeType="clickEffect">
+                                  <p:stCondLst>
+                                    <p:cond delay="0"/>
+                                  </p:stCondLst>
+                                  <p:childTnLst>
+                                    <p:set>
+                                      <p:cBhvr>
+                                        <p:cTn id="6" dur="1" fill="hold">
+                                          <p:stCondLst>
+                                            <p:cond delay="0"/>
+                                          </p:stCondLst>
+                                        </p:cTn>
+                                        <p:tgtEl>
+                                          <p:spTgt spid="5"/>
+                                        </p:tgtEl>
+                                        <p:attrNameLst>
+                                          <p:attrName>style.visibility</p:attrName>
+                                        </p:attrNameLst>
+                                      </p:cBhvr>
+                                      <p:to>
+                                        <p:strVal val="visible"/>
+                                      </p:to>
+                                    </p:set>
+                                  </p:childTnLst>
+                                </p:cTn>
+                              </p:par>
+                              <p:par>
+                                <p:cTn id="7" presetID="1" presetClass="entr" presetSubtype="0" fill="hold" grpId="0" nodeType="withEffect">
+                                  <p:stCondLst>
+                                    <p:cond delay="0"/>
+                                  </p:stCondLst>
+                                  <p:childTnLst>
+                                    <p:set>
+                                      <p:cBhvr>
+                                        <p:cTn id="8" dur="1" fill="hold">
+                                          <p:stCondLst>
+                                            <p:cond delay="0"/>
+                                          </p:stCondLst>
+                                        </p:cTn>
+                                        <p:tgtEl>
+                                          <p:spTgt spid="6"/>
+                                        </p:tgtEl>
+                                        <p:attrNameLst>
+                                          <p:attrName>style.visibility</p:attrName>
+                                        </p:attrNameLst>
+                                      </p:cBhvr>
+                                      <p:to>
+                                        <p:strVal val="visible"/>
+                                      </p:to>
+                                    </p:set>
+                                  </p:childTnLst>
+                                </p:cTn>
+                              </p:par>
+                              <p:par>
+                                <p:cTn id="9" presetID="1" presetClass="entr" presetSubtype="0" fill="hold" grpId="0" nodeType="withEffect">
+                                  <p:stCondLst>
+                                    <p:cond delay="0"/>
+                                  </p:stCondLst>
+                                  <p:childTnLst>
+                                    <p:set>
+                                      <p:cBhvr>
+                                        <p:cTn id="10" dur="1" fill="hold">
+                                          <p:stCondLst>
+                                            <p:cond delay="0"/>
+                                          </p:stCondLst>
+                                        </p:cTn>
+                                        <p:tgtEl>
+                                          <p:spTgt spid="7"/>
+                                        </p:tgtEl>
+                                        <p:attrNameLst>
+                                          <p:attrName>style.visibility</p:attrName>
+                                        </p:attrNameLst>
+                                      </p:cBhvr>
+                                      <p:to>
+                                        <p:strVal val="visible"/>
+                                      </p:to>
+                                    </p:set>
+                                  </p:childTnLst>
+                                </p:cTn>
+                              </p:par>
+                            </p:childTnLst>
+                          </p:cTn>
+                        </p:par>
+                      </p:childTnLst>
+                    </p:cTn>
+                  </p:par>
+                </p:childTnLst>
+              </p:cTn>
+              <p:prevCondLst>
+                <p:cond evt="onPrev" delay="0">
+                  <p:tgtEl>
+                    <p:sldTgt/>
+                  </p:tgtEl>
+                </p:cond>
+              </p:prevCondLst>
+              <p:nextCondLst>
+                <p:cond evt="onNext" delay="0">
+                  <p:tgtEl>
+                    <p:sldTgt/>
+                  </p:tgtEl>
+                </p:cond>
+              </p:nextCondLst>
+            </p:seq>
+          </p:childTnLst>
+        </p:cTn>
+      </p:par>
+    </p:tnLst>
+    <p:bldLst>
+      <p:bldP spid="5" grpId="0"/>
+      <p:bldP spid="6" grpId="0"/>
+      <p:bldP spid="7" grpId="0"/>
+    </p:bldLst>
+  </p:timing>
 </p:sld>
 </file>
 
@@ -13883,7 +14536,7 @@
         </p:nvSpPr>
         <p:spPr>
           <a:xfrm>
-            <a:off x="948967" y="2066306"/>
+            <a:off x="1063267" y="2295449"/>
             <a:ext cx="7530015" cy="4247317"/>
           </a:xfrm>
           <a:prstGeom prst="rect">
@@ -15739,6 +16392,83 @@
           </a:p>
         </p:txBody>
       </p:sp>
+      <p:sp>
+        <p:nvSpPr>
+          <p:cNvPr id="5" name="矩形 4">
+            <a:extLst>
+              <a:ext uri="{FF2B5EF4-FFF2-40B4-BE49-F238E27FC236}">
+                <a16:creationId xmlns:a16="http://schemas.microsoft.com/office/drawing/2014/main" id="{13801ACC-CB99-5E49-B941-517E93097D7C}"/>
+              </a:ext>
+            </a:extLst>
+          </p:cNvPr>
+          <p:cNvSpPr/>
+          <p:nvPr/>
+        </p:nvSpPr>
+        <p:spPr>
+          <a:xfrm>
+            <a:off x="1471845" y="6393724"/>
+            <a:ext cx="2185214" cy="400110"/>
+          </a:xfrm>
+          <a:prstGeom prst="rect">
+            <a:avLst/>
+          </a:prstGeom>
+          <a:solidFill>
+            <a:schemeClr val="bg1"/>
+          </a:solidFill>
+        </p:spPr>
+        <p:txBody>
+          <a:bodyPr wrap="none">
+            <a:spAutoFit/>
+          </a:bodyPr>
+          <a:lstStyle/>
+          <a:p>
+            <a:r>
+              <a:rPr lang="en-US" altLang="zh-CN" sz="2000" dirty="0">
+                <a:solidFill>
+                  <a:srgbClr val="0000CC"/>
+                </a:solidFill>
+                <a:highlight>
+                  <a:srgbClr val="FFFF00"/>
+                </a:highlight>
+                <a:latin typeface="Menlo" panose="020B0609030804020204" pitchFamily="49" charset="0"/>
+              </a:rPr>
+              <a:t>template1</a:t>
+            </a:r>
+            <a:r>
+              <a:rPr lang="en" altLang="zh-CN" sz="2000" dirty="0">
+                <a:solidFill>
+                  <a:srgbClr val="0000CC"/>
+                </a:solidFill>
+                <a:highlight>
+                  <a:srgbClr val="FFFF00"/>
+                </a:highlight>
+                <a:latin typeface="Menlo" panose="020B0609030804020204" pitchFamily="49" charset="0"/>
+              </a:rPr>
+              <a:t>.</a:t>
+            </a:r>
+            <a:r>
+              <a:rPr lang="en" altLang="zh-CN" sz="2000" dirty="0" err="1">
+                <a:solidFill>
+                  <a:srgbClr val="0000CC"/>
+                </a:solidFill>
+                <a:highlight>
+                  <a:srgbClr val="FFFF00"/>
+                </a:highlight>
+                <a:latin typeface="Menlo" panose="020B0609030804020204" pitchFamily="49" charset="0"/>
+              </a:rPr>
+              <a:t>cpp</a:t>
+            </a:r>
+            <a:endParaRPr lang="zh-CN" altLang="en-US" sz="2000" dirty="0">
+              <a:solidFill>
+                <a:srgbClr val="0000CC"/>
+              </a:solidFill>
+              <a:highlight>
+                <a:srgbClr val="FFFF00"/>
+              </a:highlight>
+            </a:endParaRPr>
+          </a:p>
+        </p:txBody>
+      </p:sp>
     </p:spTree>
     <p:extLst>
       <p:ext uri="{BB962C8B-B14F-4D97-AF65-F5344CB8AC3E}">
@@ -15749,6 +16479,324 @@
   <p:clrMapOvr>
     <a:masterClrMapping/>
   </p:clrMapOvr>
+  <p:timing>
+    <p:tnLst>
+      <p:par>
+        <p:cTn id="1" dur="indefinite" restart="never" nodeType="tmRoot">
+          <p:childTnLst>
+            <p:seq concurrent="1" nextAc="seek">
+              <p:cTn id="2" dur="indefinite" nodeType="mainSeq">
+                <p:childTnLst>
+                  <p:par>
+                    <p:cTn id="3" fill="hold">
+                      <p:stCondLst>
+                        <p:cond delay="indefinite"/>
+                      </p:stCondLst>
+                      <p:childTnLst>
+                        <p:par>
+                          <p:cTn id="4" fill="hold">
+                            <p:stCondLst>
+                              <p:cond delay="0"/>
+                            </p:stCondLst>
+                            <p:childTnLst>
+                              <p:par>
+                                <p:cTn id="5" presetID="1" presetClass="entr" presetSubtype="0" fill="hold" nodeType="clickEffect">
+                                  <p:stCondLst>
+                                    <p:cond delay="0"/>
+                                  </p:stCondLst>
+                                  <p:childTnLst>
+                                    <p:set>
+                                      <p:cBhvr>
+                                        <p:cTn id="6" dur="1" fill="hold">
+                                          <p:stCondLst>
+                                            <p:cond delay="0"/>
+                                          </p:stCondLst>
+                                        </p:cTn>
+                                        <p:tgtEl>
+                                          <p:spTgt spid="4">
+                                            <p:txEl>
+                                              <p:pRg st="6" end="6"/>
+                                            </p:txEl>
+                                          </p:spTgt>
+                                        </p:tgtEl>
+                                        <p:attrNameLst>
+                                          <p:attrName>style.visibility</p:attrName>
+                                        </p:attrNameLst>
+                                      </p:cBhvr>
+                                      <p:to>
+                                        <p:strVal val="visible"/>
+                                      </p:to>
+                                    </p:set>
+                                  </p:childTnLst>
+                                </p:cTn>
+                              </p:par>
+                              <p:par>
+                                <p:cTn id="7" presetID="1" presetClass="entr" presetSubtype="0" fill="hold" nodeType="withEffect">
+                                  <p:stCondLst>
+                                    <p:cond delay="0"/>
+                                  </p:stCondLst>
+                                  <p:childTnLst>
+                                    <p:set>
+                                      <p:cBhvr>
+                                        <p:cTn id="8" dur="1" fill="hold">
+                                          <p:stCondLst>
+                                            <p:cond delay="0"/>
+                                          </p:stCondLst>
+                                        </p:cTn>
+                                        <p:tgtEl>
+                                          <p:spTgt spid="4">
+                                            <p:txEl>
+                                              <p:pRg st="7" end="7"/>
+                                            </p:txEl>
+                                          </p:spTgt>
+                                        </p:tgtEl>
+                                        <p:attrNameLst>
+                                          <p:attrName>style.visibility</p:attrName>
+                                        </p:attrNameLst>
+                                      </p:cBhvr>
+                                      <p:to>
+                                        <p:strVal val="visible"/>
+                                      </p:to>
+                                    </p:set>
+                                  </p:childTnLst>
+                                </p:cTn>
+                              </p:par>
+                            </p:childTnLst>
+                          </p:cTn>
+                        </p:par>
+                      </p:childTnLst>
+                    </p:cTn>
+                  </p:par>
+                  <p:par>
+                    <p:cTn id="9" fill="hold">
+                      <p:stCondLst>
+                        <p:cond delay="indefinite"/>
+                      </p:stCondLst>
+                      <p:childTnLst>
+                        <p:par>
+                          <p:cTn id="10" fill="hold">
+                            <p:stCondLst>
+                              <p:cond delay="0"/>
+                            </p:stCondLst>
+                            <p:childTnLst>
+                              <p:par>
+                                <p:cTn id="11" presetID="1" presetClass="entr" presetSubtype="0" fill="hold" nodeType="clickEffect">
+                                  <p:stCondLst>
+                                    <p:cond delay="0"/>
+                                  </p:stCondLst>
+                                  <p:childTnLst>
+                                    <p:set>
+                                      <p:cBhvr>
+                                        <p:cTn id="12" dur="1" fill="hold">
+                                          <p:stCondLst>
+                                            <p:cond delay="0"/>
+                                          </p:stCondLst>
+                                        </p:cTn>
+                                        <p:tgtEl>
+                                          <p:spTgt spid="4">
+                                            <p:txEl>
+                                              <p:pRg st="9" end="9"/>
+                                            </p:txEl>
+                                          </p:spTgt>
+                                        </p:tgtEl>
+                                        <p:attrNameLst>
+                                          <p:attrName>style.visibility</p:attrName>
+                                        </p:attrNameLst>
+                                      </p:cBhvr>
+                                      <p:to>
+                                        <p:strVal val="visible"/>
+                                      </p:to>
+                                    </p:set>
+                                  </p:childTnLst>
+                                </p:cTn>
+                              </p:par>
+                              <p:par>
+                                <p:cTn id="13" presetID="1" presetClass="entr" presetSubtype="0" fill="hold" nodeType="withEffect">
+                                  <p:stCondLst>
+                                    <p:cond delay="0"/>
+                                  </p:stCondLst>
+                                  <p:childTnLst>
+                                    <p:set>
+                                      <p:cBhvr>
+                                        <p:cTn id="14" dur="1" fill="hold">
+                                          <p:stCondLst>
+                                            <p:cond delay="0"/>
+                                          </p:stCondLst>
+                                        </p:cTn>
+                                        <p:tgtEl>
+                                          <p:spTgt spid="4">
+                                            <p:txEl>
+                                              <p:pRg st="10" end="10"/>
+                                            </p:txEl>
+                                          </p:spTgt>
+                                        </p:tgtEl>
+                                        <p:attrNameLst>
+                                          <p:attrName>style.visibility</p:attrName>
+                                        </p:attrNameLst>
+                                      </p:cBhvr>
+                                      <p:to>
+                                        <p:strVal val="visible"/>
+                                      </p:to>
+                                    </p:set>
+                                  </p:childTnLst>
+                                </p:cTn>
+                              </p:par>
+                            </p:childTnLst>
+                          </p:cTn>
+                        </p:par>
+                      </p:childTnLst>
+                    </p:cTn>
+                  </p:par>
+                  <p:par>
+                    <p:cTn id="15" fill="hold">
+                      <p:stCondLst>
+                        <p:cond delay="indefinite"/>
+                      </p:stCondLst>
+                      <p:childTnLst>
+                        <p:par>
+                          <p:cTn id="16" fill="hold">
+                            <p:stCondLst>
+                              <p:cond delay="0"/>
+                            </p:stCondLst>
+                            <p:childTnLst>
+                              <p:par>
+                                <p:cTn id="17" presetID="1" presetClass="entr" presetSubtype="0" fill="hold" nodeType="clickEffect">
+                                  <p:stCondLst>
+                                    <p:cond delay="0"/>
+                                  </p:stCondLst>
+                                  <p:childTnLst>
+                                    <p:set>
+                                      <p:cBhvr>
+                                        <p:cTn id="18" dur="1" fill="hold">
+                                          <p:stCondLst>
+                                            <p:cond delay="0"/>
+                                          </p:stCondLst>
+                                        </p:cTn>
+                                        <p:tgtEl>
+                                          <p:spTgt spid="4">
+                                            <p:txEl>
+                                              <p:pRg st="12" end="12"/>
+                                            </p:txEl>
+                                          </p:spTgt>
+                                        </p:tgtEl>
+                                        <p:attrNameLst>
+                                          <p:attrName>style.visibility</p:attrName>
+                                        </p:attrNameLst>
+                                      </p:cBhvr>
+                                      <p:to>
+                                        <p:strVal val="visible"/>
+                                      </p:to>
+                                    </p:set>
+                                  </p:childTnLst>
+                                </p:cTn>
+                              </p:par>
+                              <p:par>
+                                <p:cTn id="19" presetID="1" presetClass="entr" presetSubtype="0" fill="hold" nodeType="withEffect">
+                                  <p:stCondLst>
+                                    <p:cond delay="0"/>
+                                  </p:stCondLst>
+                                  <p:childTnLst>
+                                    <p:set>
+                                      <p:cBhvr>
+                                        <p:cTn id="20" dur="1" fill="hold">
+                                          <p:stCondLst>
+                                            <p:cond delay="0"/>
+                                          </p:stCondLst>
+                                        </p:cTn>
+                                        <p:tgtEl>
+                                          <p:spTgt spid="4">
+                                            <p:txEl>
+                                              <p:pRg st="13" end="13"/>
+                                            </p:txEl>
+                                          </p:spTgt>
+                                        </p:tgtEl>
+                                        <p:attrNameLst>
+                                          <p:attrName>style.visibility</p:attrName>
+                                        </p:attrNameLst>
+                                      </p:cBhvr>
+                                      <p:to>
+                                        <p:strVal val="visible"/>
+                                      </p:to>
+                                    </p:set>
+                                  </p:childTnLst>
+                                </p:cTn>
+                              </p:par>
+                            </p:childTnLst>
+                          </p:cTn>
+                        </p:par>
+                      </p:childTnLst>
+                    </p:cTn>
+                  </p:par>
+                  <p:par>
+                    <p:cTn id="21" fill="hold">
+                      <p:stCondLst>
+                        <p:cond delay="indefinite"/>
+                      </p:stCondLst>
+                      <p:childTnLst>
+                        <p:par>
+                          <p:cTn id="22" fill="hold">
+                            <p:stCondLst>
+                              <p:cond delay="0"/>
+                            </p:stCondLst>
+                            <p:childTnLst>
+                              <p:par>
+                                <p:cTn id="23" presetID="1" presetClass="entr" presetSubtype="0" fill="hold" grpId="0" nodeType="clickEffect">
+                                  <p:stCondLst>
+                                    <p:cond delay="0"/>
+                                  </p:stCondLst>
+                                  <p:childTnLst>
+                                    <p:set>
+                                      <p:cBhvr>
+                                        <p:cTn id="24" dur="1" fill="hold">
+                                          <p:stCondLst>
+                                            <p:cond delay="0"/>
+                                          </p:stCondLst>
+                                        </p:cTn>
+                                        <p:tgtEl>
+                                          <p:spTgt spid="5"/>
+                                        </p:tgtEl>
+                                        <p:attrNameLst>
+                                          <p:attrName>style.visibility</p:attrName>
+                                        </p:attrNameLst>
+                                      </p:cBhvr>
+                                      <p:to>
+                                        <p:strVal val="visible"/>
+                                      </p:to>
+                                    </p:set>
+                                  </p:childTnLst>
+                                </p:cTn>
+                              </p:par>
+                            </p:childTnLst>
+                          </p:cTn>
+                        </p:par>
+                      </p:childTnLst>
+                    </p:cTn>
+                  </p:par>
+                </p:childTnLst>
+              </p:cTn>
+              <p:prevCondLst>
+                <p:cond evt="onPrev" delay="0">
+                  <p:tgtEl>
+                    <p:sldTgt/>
+                  </p:tgtEl>
+                </p:cond>
+              </p:prevCondLst>
+              <p:nextCondLst>
+                <p:cond evt="onNext" delay="0">
+                  <p:tgtEl>
+                    <p:sldTgt/>
+                  </p:tgtEl>
+                </p:cond>
+              </p:nextCondLst>
+            </p:seq>
+          </p:childTnLst>
+        </p:cTn>
+      </p:par>
+    </p:tnLst>
+    <p:bldLst>
+      <p:bldP spid="5" grpId="0" animBg="1"/>
+    </p:bldLst>
+  </p:timing>
 </p:sld>
 </file>
 

</xml_diff>